<commit_message>
changes in prep for resubmission. Still needs cleanup
</commit_message>
<xml_diff>
--- a/results/map.pptx
+++ b/results/map.pptx
@@ -499,6 +499,72 @@
     </a:lvl9pPr>
   </p:notesStyle>
 </p:notesMaster>
+</file>
+
+<file path=ppt/notesSlides/notesSlide1.xml><?xml version="1.0" encoding="utf-8"?>
+<p:notes xmlns:a="http://schemas.openxmlformats.org/drawingml/2006/main" xmlns:r="http://schemas.openxmlformats.org/officeDocument/2006/relationships" xmlns:p="http://schemas.openxmlformats.org/presentationml/2006/main">
+  <p:cSld>
+    <p:spTree>
+      <p:nvGrpSpPr>
+        <p:cNvPr id="1" name=""/>
+        <p:cNvGrpSpPr/>
+        <p:nvPr/>
+      </p:nvGrpSpPr>
+      <p:grpSpPr>
+        <a:xfrm>
+          <a:off x="0" y="0"/>
+          <a:ext cx="0" cy="0"/>
+          <a:chOff x="0" y="0"/>
+          <a:chExt cx="0" cy="0"/>
+        </a:xfrm>
+      </p:grpSpPr>
+      <p:sp>
+        <p:nvSpPr>
+          <p:cNvPr id="2" name="Slide Image Placeholder 1"/>
+          <p:cNvSpPr>
+            <a:spLocks noGrp="1" noRot="1" noChangeAspect="1"/>
+          </p:cNvSpPr>
+          <p:nvPr>
+            <p:ph type="sldImg"/>
+          </p:nvPr>
+        </p:nvSpPr>
+        <p:spPr>
+          <a:xfrm>
+            <a:off x="381000" y="685800"/>
+            <a:ext cx="6096000" cy="3429000"/>
+          </a:xfrm>
+        </p:spPr>
+      </p:sp>
+      <p:sp>
+        <p:nvSpPr>
+          <p:cNvPr id="3" name="Notes Placeholder 2"/>
+          <p:cNvSpPr>
+            <a:spLocks noGrp="1"/>
+          </p:cNvSpPr>
+          <p:nvPr>
+            <p:ph type="body" idx="1"/>
+          </p:nvPr>
+        </p:nvSpPr>
+        <p:spPr/>
+        <p:txBody>
+          <a:bodyPr/>
+          <a:lstStyle/>
+          <a:p>
+            <a:endParaRPr lang="en-US" dirty="0"/>
+          </a:p>
+        </p:txBody>
+      </p:sp>
+    </p:spTree>
+    <p:extLst>
+      <p:ext uri="{BB962C8B-B14F-4D97-AF65-F5344CB8AC3E}">
+        <p14:creationId xmlns:p14="http://schemas.microsoft.com/office/powerpoint/2010/main" val="3823509568"/>
+      </p:ext>
+    </p:extLst>
+  </p:cSld>
+  <p:clrMapOvr>
+    <a:masterClrMapping/>
+  </p:clrMapOvr>
+</p:notes>
 </file>
 
 <file path=ppt/slideLayouts/slideLayout1.xml><?xml version="1.0" encoding="utf-8"?>
@@ -3027,6 +3093,42 @@
           <a:chExt cx="0" cy="0"/>
         </a:xfrm>
       </p:grpSpPr>
+      <p:pic>
+        <p:nvPicPr>
+          <p:cNvPr id="4" name="Picture 3" descr="A map of the world&#10;&#10;Description automatically generated">
+            <a:extLst>
+              <a:ext uri="{FF2B5EF4-FFF2-40B4-BE49-F238E27FC236}">
+                <a16:creationId xmlns:a16="http://schemas.microsoft.com/office/drawing/2014/main" id="{CEE61D48-2747-424A-4E66-F0D85BCAAB94}"/>
+              </a:ext>
+            </a:extLst>
+          </p:cNvPr>
+          <p:cNvPicPr>
+            <a:picLocks noChangeAspect="1"/>
+          </p:cNvPicPr>
+          <p:nvPr/>
+        </p:nvPicPr>
+        <p:blipFill>
+          <a:blip r:embed="rId3" cstate="print">
+            <a:extLst>
+              <a:ext uri="{28A0092B-C50C-407E-A947-70E740481C1C}">
+                <a14:useLocalDpi xmlns:a14="http://schemas.microsoft.com/office/drawing/2010/main" val="0"/>
+              </a:ext>
+            </a:extLst>
+          </a:blip>
+          <a:stretch>
+            <a:fillRect/>
+          </a:stretch>
+        </p:blipFill>
+        <p:spPr>
+          <a:xfrm>
+            <a:off x="0" y="14744"/>
+            <a:ext cx="18703636" cy="13716000"/>
+          </a:xfrm>
+          <a:prstGeom prst="rect">
+            <a:avLst/>
+          </a:prstGeom>
+        </p:spPr>
+      </p:pic>
       <p:grpSp>
         <p:nvGrpSpPr>
           <p:cNvPr id="27" name="Group 26">
@@ -3041,48 +3143,12 @@
         </p:nvGrpSpPr>
         <p:grpSpPr>
           <a:xfrm>
-            <a:off x="0" y="0"/>
-            <a:ext cx="18703636" cy="13716000"/>
-            <a:chOff x="2840182" y="0"/>
-            <a:chExt cx="18703636" cy="13716000"/>
+            <a:off x="4879279" y="1030967"/>
+            <a:ext cx="13057739" cy="10471222"/>
+            <a:chOff x="7719461" y="1030967"/>
+            <a:chExt cx="13057739" cy="10471222"/>
           </a:xfrm>
         </p:grpSpPr>
-        <p:pic>
-          <p:nvPicPr>
-            <p:cNvPr id="2" name="Picture 1" descr="Map&#10;&#10;Description automatically generated with medium confidence">
-              <a:extLst>
-                <a:ext uri="{FF2B5EF4-FFF2-40B4-BE49-F238E27FC236}">
-                  <a16:creationId xmlns:a16="http://schemas.microsoft.com/office/drawing/2014/main" id="{4261746D-D138-63F7-777A-91B4F4186FA7}"/>
-                </a:ext>
-              </a:extLst>
-            </p:cNvPr>
-            <p:cNvPicPr>
-              <a:picLocks noChangeAspect="1"/>
-            </p:cNvPicPr>
-            <p:nvPr/>
-          </p:nvPicPr>
-          <p:blipFill>
-            <a:blip r:embed="rId2" cstate="print">
-              <a:extLst>
-                <a:ext uri="{28A0092B-C50C-407E-A947-70E740481C1C}">
-                  <a14:useLocalDpi xmlns:a14="http://schemas.microsoft.com/office/drawing/2010/main" val="0"/>
-                </a:ext>
-              </a:extLst>
-            </a:blip>
-            <a:stretch>
-              <a:fillRect/>
-            </a:stretch>
-          </p:blipFill>
-          <p:spPr>
-            <a:xfrm>
-              <a:off x="2840182" y="0"/>
-              <a:ext cx="18703636" cy="13716000"/>
-            </a:xfrm>
-            <a:prstGeom prst="rect">
-              <a:avLst/>
-            </a:prstGeom>
-          </p:spPr>
-        </p:pic>
         <p:sp>
           <p:nvSpPr>
             <p:cNvPr id="10" name="Freeform: Shape 9">
@@ -6647,16 +6713,13 @@
               </a:pathLst>
             </a:custGeom>
             <a:solidFill>
-              <a:schemeClr val="accent3">
-                <a:lumMod val="75000"/>
-                <a:alpha val="53000"/>
-              </a:schemeClr>
+              <a:srgbClr val="393E42">
+                <a:alpha val="55000"/>
+              </a:srgbClr>
             </a:solidFill>
             <a:ln w="38100" cap="flat">
               <a:solidFill>
-                <a:schemeClr val="accent3">
-                  <a:lumMod val="50000"/>
-                </a:schemeClr>
+                <a:srgbClr val="393E42"/>
               </a:solidFill>
               <a:miter lim="400000"/>
             </a:ln>
@@ -6697,7 +6760,7 @@
                 <a:buNone/>
                 <a:tabLst/>
               </a:pPr>
-              <a:endParaRPr kumimoji="0" lang="en-US" sz="3200" b="0" i="0" u="none" strike="noStrike" cap="none" spc="0" normalizeH="0" baseline="0">
+              <a:endParaRPr kumimoji="0" lang="en-US" sz="3200" b="0" i="0" u="none" strike="noStrike" cap="none" spc="0" normalizeH="0" baseline="0" dirty="0">
                 <a:ln>
                   <a:noFill/>
                 </a:ln>
@@ -8142,16 +8205,13 @@
               </a:pathLst>
             </a:custGeom>
             <a:solidFill>
-              <a:schemeClr val="accent1">
-                <a:lumMod val="75000"/>
-                <a:alpha val="40000"/>
-              </a:schemeClr>
+              <a:srgbClr val="EB612E">
+                <a:alpha val="39000"/>
+              </a:srgbClr>
             </a:solidFill>
             <a:ln w="38100" cap="flat">
               <a:solidFill>
-                <a:schemeClr val="tx1">
-                  <a:alpha val="55000"/>
-                </a:schemeClr>
+                <a:srgbClr val="EB612E"/>
               </a:solidFill>
               <a:miter lim="400000"/>
             </a:ln>
@@ -8230,17 +8290,13 @@
               <a:avLst/>
             </a:prstGeom>
             <a:solidFill>
-              <a:schemeClr val="accent1">
-                <a:lumMod val="75000"/>
+              <a:srgbClr val="EB612E">
                 <a:alpha val="48000"/>
-              </a:schemeClr>
+              </a:srgbClr>
             </a:solidFill>
             <a:ln w="28575" cap="flat">
               <a:solidFill>
-                <a:schemeClr val="accent1">
-                  <a:lumMod val="50000"/>
-                  <a:alpha val="92000"/>
-                </a:schemeClr>
+                <a:srgbClr val="EB612E"/>
               </a:solidFill>
               <a:miter lim="400000"/>
             </a:ln>
@@ -8319,17 +8375,13 @@
               <a:avLst/>
             </a:prstGeom>
             <a:solidFill>
-              <a:schemeClr val="accent1">
-                <a:lumMod val="75000"/>
+              <a:srgbClr val="EB612E">
                 <a:alpha val="48000"/>
-              </a:schemeClr>
+              </a:srgbClr>
             </a:solidFill>
             <a:ln w="28575" cap="flat">
               <a:solidFill>
-                <a:schemeClr val="accent1">
-                  <a:lumMod val="50000"/>
-                  <a:alpha val="92000"/>
-                </a:schemeClr>
+                <a:srgbClr val="EB612E"/>
               </a:solidFill>
               <a:miter lim="400000"/>
             </a:ln>
@@ -8408,17 +8460,13 @@
               <a:avLst/>
             </a:prstGeom>
             <a:solidFill>
-              <a:schemeClr val="accent1">
-                <a:lumMod val="75000"/>
+              <a:srgbClr val="EB612E">
                 <a:alpha val="48000"/>
-              </a:schemeClr>
+              </a:srgbClr>
             </a:solidFill>
             <a:ln w="28575" cap="flat">
               <a:solidFill>
-                <a:schemeClr val="accent1">
-                  <a:lumMod val="50000"/>
-                  <a:alpha val="92000"/>
-                </a:schemeClr>
+                <a:srgbClr val="EB612E"/>
               </a:solidFill>
               <a:miter lim="400000"/>
             </a:ln>
@@ -9814,14 +9862,13 @@
               </a:pathLst>
             </a:custGeom>
             <a:solidFill>
-              <a:schemeClr val="accent1">
-                <a:lumMod val="50000"/>
-                <a:alpha val="77000"/>
-              </a:schemeClr>
+              <a:srgbClr val="809A54">
+                <a:alpha val="76863"/>
+              </a:srgbClr>
             </a:solidFill>
             <a:ln w="28575" cap="flat">
               <a:solidFill>
-                <a:srgbClr val="002060"/>
+                <a:srgbClr val="809A54"/>
               </a:solidFill>
               <a:miter lim="400000"/>
             </a:ln>
@@ -10121,14 +10168,13 @@
               </a:pathLst>
             </a:custGeom>
             <a:solidFill>
-              <a:schemeClr val="accent1">
-                <a:lumMod val="50000"/>
-                <a:alpha val="77000"/>
-              </a:schemeClr>
+              <a:srgbClr val="809A54">
+                <a:alpha val="76863"/>
+              </a:srgbClr>
             </a:solidFill>
             <a:ln w="12700" cap="flat">
               <a:solidFill>
-                <a:srgbClr val="002060"/>
+                <a:srgbClr val="809A54"/>
               </a:solidFill>
               <a:miter lim="400000"/>
             </a:ln>
@@ -11060,14 +11106,13 @@
               </a:pathLst>
             </a:custGeom>
             <a:solidFill>
-              <a:schemeClr val="accent1">
-                <a:lumMod val="50000"/>
-                <a:alpha val="77000"/>
-              </a:schemeClr>
+              <a:srgbClr val="809A54">
+                <a:alpha val="76863"/>
+              </a:srgbClr>
             </a:solidFill>
             <a:ln w="12700" cap="flat">
               <a:solidFill>
-                <a:srgbClr val="002060"/>
+                <a:srgbClr val="809A54"/>
               </a:solidFill>
               <a:miter lim="400000"/>
             </a:ln>
@@ -11181,7 +11226,7 @@
         </p:nvGrpSpPr>
         <p:grpSpPr>
           <a:xfrm>
-            <a:off x="18889912" y="4680327"/>
+            <a:off x="18889912" y="4753163"/>
             <a:ext cx="5710527" cy="2765131"/>
             <a:chOff x="18747194" y="4680326"/>
             <a:chExt cx="5710527" cy="2765131"/>
@@ -11208,14 +11253,13 @@
               <a:avLst/>
             </a:prstGeom>
             <a:solidFill>
-              <a:schemeClr val="accent1">
-                <a:lumMod val="50000"/>
+              <a:srgbClr val="809A54">
                 <a:alpha val="78000"/>
-              </a:schemeClr>
+              </a:srgbClr>
             </a:solidFill>
             <a:ln w="38100" cap="flat">
               <a:solidFill>
-                <a:srgbClr val="002060"/>
+                <a:srgbClr val="809A54"/>
               </a:solidFill>
               <a:miter lim="400000"/>
             </a:ln>
@@ -11256,7 +11300,7 @@
                 <a:buNone/>
                 <a:tabLst/>
               </a:pPr>
-              <a:endParaRPr kumimoji="0" lang="en-US" sz="3200" b="0" i="0" u="none" strike="noStrike" cap="none" spc="0" normalizeH="0" baseline="0">
+              <a:endParaRPr kumimoji="0" lang="en-US" sz="3200" b="0" i="0" u="none" strike="noStrike" cap="none" spc="0" normalizeH="0" baseline="0" dirty="0">
                 <a:ln>
                   <a:noFill/>
                 </a:ln>
@@ -11294,14 +11338,13 @@
               <a:avLst/>
             </a:prstGeom>
             <a:solidFill>
-              <a:schemeClr val="accent1">
-                <a:lumMod val="75000"/>
-                <a:alpha val="48000"/>
-              </a:schemeClr>
+              <a:srgbClr val="EB612E">
+                <a:alpha val="39000"/>
+              </a:srgbClr>
             </a:solidFill>
             <a:ln w="38100" cap="flat">
               <a:solidFill>
-                <a:srgbClr val="002060"/>
+                <a:srgbClr val="EB612E"/>
               </a:solidFill>
               <a:miter lim="400000"/>
             </a:ln>
@@ -11380,16 +11423,13 @@
               <a:avLst/>
             </a:prstGeom>
             <a:solidFill>
-              <a:schemeClr val="accent3">
-                <a:lumMod val="75000"/>
-                <a:alpha val="53000"/>
-              </a:schemeClr>
+              <a:srgbClr val="393E42">
+                <a:alpha val="55000"/>
+              </a:srgbClr>
             </a:solidFill>
             <a:ln w="38100" cap="flat">
               <a:solidFill>
-                <a:schemeClr val="accent3">
-                  <a:lumMod val="50000"/>
-                </a:schemeClr>
+                <a:srgbClr val="393E42"/>
               </a:solidFill>
               <a:miter lim="400000"/>
             </a:ln>
@@ -11797,7 +11837,9 @@
             <a:avLst/>
           </a:prstGeom>
           <a:solidFill>
-            <a:srgbClr val="FFC000"/>
+            <a:schemeClr val="accent1">
+              <a:lumMod val="75000"/>
+            </a:schemeClr>
           </a:solidFill>
           <a:ln w="12700" cap="flat">
             <a:noFill/>
@@ -12155,6 +12197,84 @@
           </a:p>
         </p:txBody>
       </p:sp>
+      <p:pic>
+        <p:nvPicPr>
+          <p:cNvPr id="5" name="Picture 4" descr="A map of the world&#10;&#10;Description automatically generated">
+            <a:extLst>
+              <a:ext uri="{FF2B5EF4-FFF2-40B4-BE49-F238E27FC236}">
+                <a16:creationId xmlns:a16="http://schemas.microsoft.com/office/drawing/2014/main" id="{0638B821-7682-8A43-8C04-1228AC9020D4}"/>
+              </a:ext>
+            </a:extLst>
+          </p:cNvPr>
+          <p:cNvPicPr>
+            <a:picLocks noChangeAspect="1"/>
+          </p:cNvPicPr>
+          <p:nvPr/>
+        </p:nvPicPr>
+        <p:blipFill rotWithShape="1">
+          <a:blip r:embed="rId4">
+            <a:extLst>
+              <a:ext uri="{28A0092B-C50C-407E-A947-70E740481C1C}">
+                <a14:useLocalDpi xmlns:a14="http://schemas.microsoft.com/office/drawing/2010/main" val="0"/>
+              </a:ext>
+            </a:extLst>
+          </a:blip>
+          <a:srcRect l="6150" t="82641" r="90903" b="11447"/>
+          <a:stretch/>
+        </p:blipFill>
+        <p:spPr>
+          <a:xfrm>
+            <a:off x="1014608" y="10739701"/>
+            <a:ext cx="1014608" cy="1492788"/>
+          </a:xfrm>
+          <a:prstGeom prst="rect">
+            <a:avLst/>
+          </a:prstGeom>
+        </p:spPr>
+      </p:pic>
+      <p:pic>
+        <p:nvPicPr>
+          <p:cNvPr id="6" name="Picture 5" descr="A butterfly on a flower&#10;&#10;Description automatically generated">
+            <a:extLst>
+              <a:ext uri="{FF2B5EF4-FFF2-40B4-BE49-F238E27FC236}">
+                <a16:creationId xmlns:a16="http://schemas.microsoft.com/office/drawing/2014/main" id="{1702CA2D-662A-1B23-B6CE-DFB66DF725B2}"/>
+              </a:ext>
+            </a:extLst>
+          </p:cNvPr>
+          <p:cNvPicPr>
+            <a:picLocks noChangeAspect="1"/>
+          </p:cNvPicPr>
+          <p:nvPr/>
+        </p:nvPicPr>
+        <p:blipFill rotWithShape="1">
+          <a:blip r:embed="rId5" cstate="print">
+            <a:extLst>
+              <a:ext uri="{28A0092B-C50C-407E-A947-70E740481C1C}">
+                <a14:useLocalDpi xmlns:a14="http://schemas.microsoft.com/office/drawing/2010/main" val="0"/>
+              </a:ext>
+            </a:extLst>
+          </a:blip>
+          <a:srcRect l="15385" t="22" r="9718" b="695"/>
+          <a:stretch/>
+        </p:blipFill>
+        <p:spPr>
+          <a:xfrm>
+            <a:off x="13502785" y="8221982"/>
+            <a:ext cx="4804878" cy="4246200"/>
+          </a:xfrm>
+          <a:prstGeom prst="round2DiagRect">
+            <a:avLst>
+              <a:gd name="adj1" fmla="val 50000"/>
+              <a:gd name="adj2" fmla="val 1744"/>
+            </a:avLst>
+          </a:prstGeom>
+          <a:ln w="76200">
+            <a:solidFill>
+              <a:srgbClr val="FF4F00"/>
+            </a:solidFill>
+          </a:ln>
+        </p:spPr>
+      </p:pic>
     </p:spTree>
     <p:extLst>
       <p:ext uri="{BB962C8B-B14F-4D97-AF65-F5344CB8AC3E}">

</xml_diff>